<commit_message>
Alteração no slide inicial
Estruturas if e else são a parte 1 do conteúdo de controle de fluxo de
execução.
</commit_message>
<xml_diff>
--- a/programacao-basica/estrutura-if-else.pptx
+++ b/programacao-basica/estrutura-if-else.pptx
@@ -6751,9 +6751,22 @@
               <a:buNone/>
             </a:pPr>
             <a:r>
-              <a:t/>
-            </a:r>
-            <a:endParaRPr/>
+              <a:rPr lang="pt-BR"/>
+              <a:t>Parte 1: </a:t>
+            </a:r>
+            <a:r>
+              <a:rPr i="1" lang="pt-BR"/>
+              <a:t>if</a:t>
+            </a:r>
+            <a:r>
+              <a:rPr lang="pt-BR"/>
+              <a:t>, </a:t>
+            </a:r>
+            <a:r>
+              <a:rPr i="1" lang="pt-BR"/>
+              <a:t>else</a:t>
+            </a:r>
+            <a:endParaRPr i="1"/>
           </a:p>
         </p:txBody>
       </p:sp>

</xml_diff>